<commit_message>
big batch of images
</commit_message>
<xml_diff>
--- a/ClimateHackathon_Submission_Nov132022.pptx
+++ b/ClimateHackathon_Submission_Nov132022.pptx
@@ -72,7 +72,7 @@
         <p:txBody>
           <a:bodyPr/>
           <a:p>
-            <a:fld id="{0DB390F3-61CD-4DFC-9FF3-C2A19F5D1B91}" type="slidenum">
+            <a:fld id="{4F39AEB6-ECEA-4FC8-915D-66B1D588297A}" type="slidenum">
               <a:t>&lt;#&gt;</a:t>
             </a:fld>
           </a:p>
@@ -281,7 +281,7 @@
         <p:txBody>
           <a:bodyPr/>
           <a:p>
-            <a:fld id="{A582416D-68F1-4FC9-8D82-74234ABA8CFE}" type="slidenum">
+            <a:fld id="{608AC04F-BCEE-45D0-A96E-5B4CBADB84D0}" type="slidenum">
               <a:t>&lt;#&gt;</a:t>
             </a:fld>
           </a:p>
@@ -576,7 +576,7 @@
         <p:txBody>
           <a:bodyPr/>
           <a:p>
-            <a:fld id="{23C90AB7-3D56-4A25-8A50-25473519878B}" type="slidenum">
+            <a:fld id="{C0389460-D828-4525-A7D9-B5F0420F5B4E}" type="slidenum">
               <a:t>&lt;#&gt;</a:t>
             </a:fld>
           </a:p>
@@ -957,7 +957,7 @@
         <p:txBody>
           <a:bodyPr/>
           <a:p>
-            <a:fld id="{1C5C3AE9-E060-4B8B-8494-67DFA6A8B715}" type="slidenum">
+            <a:fld id="{F90E005B-B8DD-4085-A790-354B9FA44DA8}" type="slidenum">
               <a:t>&lt;#&gt;</a:t>
             </a:fld>
           </a:p>
@@ -1040,7 +1040,7 @@
         <p:txBody>
           <a:bodyPr/>
           <a:p>
-            <a:fld id="{44A5DBDA-841F-442E-86DC-673BDAFDA479}" type="slidenum">
+            <a:fld id="{00DE75C6-FEDB-40DB-B6CF-BC91D75C2623}" type="slidenum">
               <a:t>&lt;#&gt;</a:t>
             </a:fld>
           </a:p>
@@ -1203,7 +1203,7 @@
         <p:txBody>
           <a:bodyPr/>
           <a:p>
-            <a:fld id="{7EB8C4F0-2B65-4EAF-82B7-756A07834BB3}" type="slidenum">
+            <a:fld id="{EC7F6B5E-F161-4A90-80C8-8F4F4CB000D6}" type="slidenum">
               <a:t>&lt;#&gt;</a:t>
             </a:fld>
           </a:p>
@@ -1369,7 +1369,7 @@
         <p:txBody>
           <a:bodyPr/>
           <a:p>
-            <a:fld id="{7D202C8D-B2C1-40DD-9BCD-BF48D4838B71}" type="slidenum">
+            <a:fld id="{0692B7E5-1628-4B9E-8DEA-A6FD70FF1CAE}" type="slidenum">
               <a:t>&lt;#&gt;</a:t>
             </a:fld>
           </a:p>
@@ -1578,7 +1578,7 @@
         <p:txBody>
           <a:bodyPr/>
           <a:p>
-            <a:fld id="{B19594AB-1715-4D69-82D6-EB7639C3BC3D}" type="slidenum">
+            <a:fld id="{CD3739AD-3DB4-4F0D-B936-4FFD0EE1F018}" type="slidenum">
               <a:t>&lt;#&gt;</a:t>
             </a:fld>
           </a:p>
@@ -1701,7 +1701,7 @@
         <p:txBody>
           <a:bodyPr/>
           <a:p>
-            <a:fld id="{DB9B9E4B-BA32-4A06-873A-B7BB19970EB0}" type="slidenum">
+            <a:fld id="{F51142D1-E055-4A85-B94A-C35B8027C954}" type="slidenum">
               <a:t>&lt;#&gt;</a:t>
             </a:fld>
           </a:p>
@@ -1822,7 +1822,7 @@
         <p:txBody>
           <a:bodyPr/>
           <a:p>
-            <a:fld id="{4F1566CC-400C-4F80-96F9-B081AB7695D2}" type="slidenum">
+            <a:fld id="{1A33270A-BA64-4DAE-BB0A-5F1CDBD24FFD}" type="slidenum">
               <a:t>&lt;#&gt;</a:t>
             </a:fld>
           </a:p>
@@ -2074,7 +2074,7 @@
         <p:txBody>
           <a:bodyPr/>
           <a:p>
-            <a:fld id="{E62E6681-F3D6-43E8-897A-F864FFAF6462}" type="slidenum">
+            <a:fld id="{1E26BEE4-6F17-4A1C-8264-CB689DFDC2D6}" type="slidenum">
               <a:t>&lt;#&gt;</a:t>
             </a:fld>
           </a:p>
@@ -2237,7 +2237,7 @@
         <p:txBody>
           <a:bodyPr/>
           <a:p>
-            <a:fld id="{B9E598CE-A88B-48B4-8F3E-5107B9034EC5}" type="slidenum">
+            <a:fld id="{3E7EF54D-1CD8-480D-A56B-3D37013C36FC}" type="slidenum">
               <a:t>&lt;#&gt;</a:t>
             </a:fld>
           </a:p>
@@ -2489,7 +2489,7 @@
         <p:txBody>
           <a:bodyPr/>
           <a:p>
-            <a:fld id="{6D8FCC05-0D1C-4007-8A61-159988019074}" type="slidenum">
+            <a:fld id="{FC01AE40-89A7-4FC4-B77B-329BF626F6C2}" type="slidenum">
               <a:t>&lt;#&gt;</a:t>
             </a:fld>
           </a:p>
@@ -2741,7 +2741,7 @@
         <p:txBody>
           <a:bodyPr/>
           <a:p>
-            <a:fld id="{BF1B5ACF-3D9C-4ED0-9185-6266E35C3138}" type="slidenum">
+            <a:fld id="{6B03FF58-38C5-4413-A82A-C27FCA63A493}" type="slidenum">
               <a:t>&lt;#&gt;</a:t>
             </a:fld>
           </a:p>
@@ -2950,7 +2950,7 @@
         <p:txBody>
           <a:bodyPr/>
           <a:p>
-            <a:fld id="{824A1476-71F6-4810-9017-2AB5238AC557}" type="slidenum">
+            <a:fld id="{89185208-3828-4B39-971B-29B4C1E9E3A6}" type="slidenum">
               <a:t>&lt;#&gt;</a:t>
             </a:fld>
           </a:p>
@@ -3245,7 +3245,7 @@
         <p:txBody>
           <a:bodyPr/>
           <a:p>
-            <a:fld id="{65B1F035-F607-4905-864A-78E378451785}" type="slidenum">
+            <a:fld id="{36F9846D-CCD1-44A9-872F-088FA1466717}" type="slidenum">
               <a:t>&lt;#&gt;</a:t>
             </a:fld>
           </a:p>
@@ -3626,7 +3626,7 @@
         <p:txBody>
           <a:bodyPr/>
           <a:p>
-            <a:fld id="{AD2F0CC9-A7AF-4EDA-B2C4-EDFF6CBE491A}" type="slidenum">
+            <a:fld id="{8A8B8221-A83F-4A4D-B657-70FF945483FB}" type="slidenum">
               <a:t>&lt;#&gt;</a:t>
             </a:fld>
           </a:p>
@@ -3792,7 +3792,7 @@
         <p:txBody>
           <a:bodyPr/>
           <a:p>
-            <a:fld id="{8196E951-654A-454E-9D22-9DD5547F083B}" type="slidenum">
+            <a:fld id="{5947F1D2-DF6C-4808-A446-BAB920ADAD02}" type="slidenum">
               <a:t>&lt;#&gt;</a:t>
             </a:fld>
           </a:p>
@@ -4001,7 +4001,7 @@
         <p:txBody>
           <a:bodyPr/>
           <a:p>
-            <a:fld id="{CC6734A4-B7E5-4028-BDA7-29714CD4D184}" type="slidenum">
+            <a:fld id="{309A2379-2B03-4CEA-9648-4F2642AD5DBB}" type="slidenum">
               <a:t>&lt;#&gt;</a:t>
             </a:fld>
           </a:p>
@@ -4124,7 +4124,7 @@
         <p:txBody>
           <a:bodyPr/>
           <a:p>
-            <a:fld id="{BE5C9AC5-055C-4E47-827A-7A2D42BC2C14}" type="slidenum">
+            <a:fld id="{63DF3220-4B2A-41D1-893C-9C9A7CD1B935}" type="slidenum">
               <a:t>&lt;#&gt;</a:t>
             </a:fld>
           </a:p>
@@ -4245,7 +4245,7 @@
         <p:txBody>
           <a:bodyPr/>
           <a:p>
-            <a:fld id="{5E09DC50-1745-494B-BF72-959D6EE1B7B4}" type="slidenum">
+            <a:fld id="{AC7CA0D4-6200-4F97-98AA-1E84A1CA67D8}" type="slidenum">
               <a:t>&lt;#&gt;</a:t>
             </a:fld>
           </a:p>
@@ -4497,7 +4497,7 @@
         <p:txBody>
           <a:bodyPr/>
           <a:p>
-            <a:fld id="{948AD3B7-ACEF-48AE-B4FC-6A7790DDBF5A}" type="slidenum">
+            <a:fld id="{2F0740E8-62F3-478C-ABE0-1E2ECE858577}" type="slidenum">
               <a:t>&lt;#&gt;</a:t>
             </a:fld>
           </a:p>
@@ -4749,7 +4749,7 @@
         <p:txBody>
           <a:bodyPr/>
           <a:p>
-            <a:fld id="{EC6109C2-51E5-49EF-800A-BA8375CCB564}" type="slidenum">
+            <a:fld id="{8F0F1684-51AB-4FCD-8D5E-1D9AB97EC0E7}" type="slidenum">
               <a:t>&lt;#&gt;</a:t>
             </a:fld>
           </a:p>
@@ -5001,7 +5001,7 @@
         <p:txBody>
           <a:bodyPr/>
           <a:p>
-            <a:fld id="{24B25CDA-D871-424D-8E76-96F881517FE2}" type="slidenum">
+            <a:fld id="{417D8FB2-DB1B-4886-9C9D-AD6F113BC59F}" type="slidenum">
               <a:t>&lt;#&gt;</a:t>
             </a:fld>
           </a:p>
@@ -5098,70 +5098,7 @@
                 </a:solidFill>
                 <a:latin typeface="Arial"/>
               </a:rPr>
-              <a:t>Click </a:t>
-            </a:r>
-            <a:r>
-              <a:rPr b="0" lang="en-US" sz="1800" spc="-1" strike="noStrike">
-                <a:solidFill>
-                  <a:srgbClr val="000000"/>
-                </a:solidFill>
-                <a:latin typeface="Arial"/>
-              </a:rPr>
-              <a:t>to </a:t>
-            </a:r>
-            <a:r>
-              <a:rPr b="0" lang="en-US" sz="1800" spc="-1" strike="noStrike">
-                <a:solidFill>
-                  <a:srgbClr val="000000"/>
-                </a:solidFill>
-                <a:latin typeface="Arial"/>
-              </a:rPr>
-              <a:t>edit </a:t>
-            </a:r>
-            <a:r>
-              <a:rPr b="0" lang="en-US" sz="1800" spc="-1" strike="noStrike">
-                <a:solidFill>
-                  <a:srgbClr val="000000"/>
-                </a:solidFill>
-                <a:latin typeface="Arial"/>
-              </a:rPr>
-              <a:t>the </a:t>
-            </a:r>
-            <a:r>
-              <a:rPr b="0" lang="en-US" sz="1800" spc="-1" strike="noStrike">
-                <a:solidFill>
-                  <a:srgbClr val="000000"/>
-                </a:solidFill>
-                <a:latin typeface="Arial"/>
-              </a:rPr>
-              <a:t>title </a:t>
-            </a:r>
-            <a:r>
-              <a:rPr b="0" lang="en-US" sz="1800" spc="-1" strike="noStrike">
-                <a:solidFill>
-                  <a:srgbClr val="000000"/>
-                </a:solidFill>
-                <a:latin typeface="Arial"/>
-              </a:rPr>
-              <a:t>text </a:t>
-            </a:r>
-            <a:r>
-              <a:rPr b="0" lang="en-US" sz="1800" spc="-1" strike="noStrike">
-                <a:solidFill>
-                  <a:srgbClr val="000000"/>
-                </a:solidFill>
-                <a:latin typeface="Arial"/>
-              </a:rPr>
-              <a:t>form</a:t>
-            </a:r>
-            <a:r>
-              <a:rPr b="0" lang="en-US" sz="1800" spc="-1" strike="noStrike">
-                <a:solidFill>
-                  <a:srgbClr val="000000"/>
-                </a:solidFill>
-                <a:latin typeface="Arial"/>
-              </a:rPr>
-              <a:t>at</a:t>
+              <a:t>Click to edit the title text format</a:t>
             </a:r>
             <a:endParaRPr b="0" lang="en-US" sz="1800" spc="-1" strike="noStrike">
               <a:solidFill>
@@ -5298,7 +5235,7 @@
                 <a:tab algn="l" pos="0"/>
               </a:tabLst>
             </a:pPr>
-            <a:fld id="{4FA9A7EF-BDF8-4664-89FF-F87FEB037C52}" type="slidenum">
+            <a:fld id="{32BFC8FC-91E8-4F93-8835-804FE2995028}" type="slidenum">
               <a:rPr b="0" lang="en-US" sz="1200" spc="-1" strike="noStrike">
                 <a:solidFill>
                   <a:srgbClr val="8b8b8b"/>
@@ -5774,7 +5711,7 @@
                 <a:tab algn="l" pos="0"/>
               </a:tabLst>
             </a:pPr>
-            <a:fld id="{2AEF4277-1467-4F64-83AD-E9641863E1D2}" type="slidenum">
+            <a:fld id="{C76DC778-190F-4A22-A263-9CEE43BEA0AC}" type="slidenum">
               <a:rPr b="0" lang="en-US" sz="1200" spc="-1" strike="noStrike">
                 <a:solidFill>
                   <a:srgbClr val="8b8b8b"/>
@@ -7170,7 +7107,7 @@
         </p:spPr>
         <p:txBody>
           <a:bodyPr lIns="90000" rIns="90000" tIns="45000" bIns="45000" anchor="t">
-            <a:normAutofit fontScale="98000"/>
+            <a:normAutofit fontScale="96000"/>
           </a:bodyPr>
           <a:p>
             <a:pPr marL="228600" indent="-228600">
@@ -7223,7 +7160,7 @@
                 </a:solidFill>
                 <a:latin typeface="Calibri"/>
               </a:rPr>
-              <a:t>The code maximizes variance to encourage creative memes</a:t>
+              <a:t>The code includes style tags to encourge variance and creative memes</a:t>
             </a:r>
             <a:endParaRPr b="0" lang="en-US" sz="2400" spc="-1" strike="noStrike">
               <a:solidFill>
@@ -7289,7 +7226,7 @@
                 <a:latin typeface="Calibri"/>
                 <a:ea typeface="DejaVu Sans"/>
               </a:rPr>
-              <a:t>Generate Climate Change Concept</a:t>
+              <a:t>Generate Climate Change Solution</a:t>
             </a:r>
             <a:endParaRPr b="0" lang="en-US" sz="1800" spc="-1" strike="noStrike">
               <a:solidFill>
@@ -7355,7 +7292,7 @@
                 <a:latin typeface="Calibri"/>
                 <a:ea typeface="DejaVu Sans"/>
               </a:rPr>
-              <a:t>Describe a funny image representing this climate change concept</a:t>
+              <a:t>Describe a image representing this climate change solution</a:t>
             </a:r>
             <a:endParaRPr b="0" lang="en-US" sz="1800" spc="-1" strike="noStrike">
               <a:solidFill>
@@ -8184,8 +8121,8 @@
         </p:blipFill>
         <p:spPr>
           <a:xfrm>
-            <a:off x="838080" y="1825560"/>
-            <a:ext cx="4342680" cy="4342680"/>
+            <a:off x="384120" y="1371600"/>
+            <a:ext cx="5330880" cy="5330880"/>
           </a:xfrm>
           <a:prstGeom prst="rect">
             <a:avLst/>
@@ -8207,8 +8144,8 @@
         </p:blipFill>
         <p:spPr>
           <a:xfrm>
-            <a:off x="7029360" y="1825560"/>
-            <a:ext cx="4350600" cy="4350600"/>
+            <a:off x="6400800" y="1425600"/>
+            <a:ext cx="5203800" cy="5203800"/>
           </a:xfrm>
           <a:prstGeom prst="rect">
             <a:avLst/>
@@ -8576,8 +8513,8 @@
         </p:blipFill>
         <p:spPr>
           <a:xfrm>
-            <a:off x="6172200" y="685800"/>
-            <a:ext cx="5568120" cy="5568120"/>
+            <a:off x="6172200" y="604080"/>
+            <a:ext cx="5796720" cy="5796720"/>
           </a:xfrm>
           <a:prstGeom prst="rect">
             <a:avLst/>
@@ -8600,8 +8537,8 @@
         </p:blipFill>
         <p:spPr>
           <a:xfrm>
-            <a:off x="350280" y="685800"/>
-            <a:ext cx="5378400" cy="5485680"/>
+            <a:off x="228600" y="561600"/>
+            <a:ext cx="5725080" cy="5839200"/>
           </a:xfrm>
           <a:prstGeom prst="rect">
             <a:avLst/>

</xml_diff>